<commit_message>
added extra reminder for activity 5 powerpoint
</commit_message>
<xml_diff>
--- a/Powerpoints/CS0007 Week 5.pptx
+++ b/Powerpoints/CS0007 Week 5.pptx
@@ -109,6 +109,11 @@
       </a:defRPr>
     </a:lvl9pPr>
   </p:defaultTextStyle>
+  <p:extLst>
+    <p:ext uri="{EFAFB233-063F-42B5-8137-9DF3F51BA10A}">
+      <p15:sldGuideLst xmlns:p15="http://schemas.microsoft.com/office/powerpoint/2012/main"/>
+    </p:ext>
+  </p:extLst>
 </p:presentation>
 </file>
 
@@ -3346,8 +3351,26 @@
           <a:p>
             <a:r>
               <a:rPr lang="en-US" dirty="0" smtClean="0"/>
-              <a:t>Ask the user for specific input (percentages in whole numbers or decimals?)</a:t>
-            </a:r>
+              <a:t>Ask the user for specific input (percentages in whole numbers or decimals</a:t>
+            </a:r>
+            <a:r>
+              <a:rPr lang="en-US" dirty="0" smtClean="0"/>
+              <a:t>?)</a:t>
+            </a:r>
+          </a:p>
+          <a:p>
+            <a:endParaRPr lang="en-US" dirty="0"/>
+          </a:p>
+          <a:p>
+            <a:r>
+              <a:rPr lang="en-US" dirty="0" smtClean="0"/>
+              <a:t>***On Activity 5, make sure to print out the percentages (of gross pay) and actual dollar amounts for electric, sewer, water, gas, food, entertainment, rent, and </a:t>
+            </a:r>
+            <a:r>
+              <a:rPr lang="en-US" smtClean="0"/>
+              <a:t>car expenses</a:t>
+            </a:r>
+            <a:endParaRPr lang="en-US" dirty="0" smtClean="0"/>
           </a:p>
         </p:txBody>
       </p:sp>

</xml_diff>